<commit_message>
se añadio animacion y contenido
</commit_message>
<xml_diff>
--- a/teoria_de_seleccion.pptx
+++ b/teoria_de_seleccion.pptx
@@ -4101,14 +4101,11 @@
           <a:p>
             <a:pPr algn="ctr"/>
             <a:r>
-              <a:rPr lang="es-ES" sz="1100" dirty="0">
+              <a:rPr lang="es-PE" sz="1100" dirty="0">
                 <a:latin typeface="Agency FB" panose="020B0503020202020204" pitchFamily="34" charset="0"/>
               </a:rPr>
               <a:t>$65</a:t>
             </a:r>
-            <a:endParaRPr lang="es-PE" sz="1100" dirty="0">
-              <a:latin typeface="Agency FB" panose="020B0503020202020204" pitchFamily="34" charset="0"/>
-            </a:endParaRPr>
           </a:p>
         </p:txBody>
       </p:sp>
@@ -4215,58 +4212,6 @@
               <a:t>$60</a:t>
             </a:r>
             <a:endParaRPr lang="es-PE" sz="1100" dirty="0">
-              <a:latin typeface="Agency FB" panose="020B0503020202020204" pitchFamily="34" charset="0"/>
-            </a:endParaRPr>
-          </a:p>
-        </p:txBody>
-      </p:sp>
-      <p:sp>
-        <p:nvSpPr>
-          <p:cNvPr id="11" name="Elipse 10">
-            <a:extLst>
-              <a:ext uri="{FF2B5EF4-FFF2-40B4-BE49-F238E27FC236}">
-                <a16:creationId xmlns:a16="http://schemas.microsoft.com/office/drawing/2014/main" id="{3F714104-7155-4EFE-BEA4-D26CF5722E6C}"/>
-              </a:ext>
-            </a:extLst>
-          </p:cNvPr>
-          <p:cNvSpPr/>
-          <p:nvPr/>
-        </p:nvSpPr>
-        <p:spPr>
-          <a:xfrm>
-            <a:off x="2093404" y="440070"/>
-            <a:ext cx="2474752" cy="394112"/>
-          </a:xfrm>
-          <a:prstGeom prst="ellipse">
-            <a:avLst/>
-          </a:prstGeom>
-        </p:spPr>
-        <p:style>
-          <a:lnRef idx="1">
-            <a:schemeClr val="accent2"/>
-          </a:lnRef>
-          <a:fillRef idx="2">
-            <a:schemeClr val="accent2"/>
-          </a:fillRef>
-          <a:effectRef idx="1">
-            <a:schemeClr val="accent2"/>
-          </a:effectRef>
-          <a:fontRef idx="minor">
-            <a:schemeClr val="dk1"/>
-          </a:fontRef>
-        </p:style>
-        <p:txBody>
-          <a:bodyPr rtlCol="0" anchor="ctr"/>
-          <a:lstStyle/>
-          <a:p>
-            <a:pPr algn="ctr"/>
-            <a:r>
-              <a:rPr lang="es-ES" sz="1400" dirty="0">
-                <a:latin typeface="Agency FB" panose="020B0503020202020204" pitchFamily="34" charset="0"/>
-              </a:rPr>
-              <a:t>Tienda de tortas</a:t>
-            </a:r>
-            <a:endParaRPr lang="es-PE" sz="1400" dirty="0">
               <a:latin typeface="Agency FB" panose="020B0503020202020204" pitchFamily="34" charset="0"/>
             </a:endParaRPr>
           </a:p>
@@ -4323,6 +4268,58 @@
           <a:p>
             <a:pPr algn="ctr"/>
             <a:endParaRPr lang="es-PE"/>
+          </a:p>
+        </p:txBody>
+      </p:sp>
+      <p:sp>
+        <p:nvSpPr>
+          <p:cNvPr id="11" name="Elipse 10">
+            <a:extLst>
+              <a:ext uri="{FF2B5EF4-FFF2-40B4-BE49-F238E27FC236}">
+                <a16:creationId xmlns:a16="http://schemas.microsoft.com/office/drawing/2014/main" id="{3F714104-7155-4EFE-BEA4-D26CF5722E6C}"/>
+              </a:ext>
+            </a:extLst>
+          </p:cNvPr>
+          <p:cNvSpPr/>
+          <p:nvPr/>
+        </p:nvSpPr>
+        <p:spPr>
+          <a:xfrm>
+            <a:off x="2093404" y="440070"/>
+            <a:ext cx="2474752" cy="394112"/>
+          </a:xfrm>
+          <a:prstGeom prst="ellipse">
+            <a:avLst/>
+          </a:prstGeom>
+        </p:spPr>
+        <p:style>
+          <a:lnRef idx="1">
+            <a:schemeClr val="accent2"/>
+          </a:lnRef>
+          <a:fillRef idx="2">
+            <a:schemeClr val="accent2"/>
+          </a:fillRef>
+          <a:effectRef idx="1">
+            <a:schemeClr val="accent2"/>
+          </a:effectRef>
+          <a:fontRef idx="minor">
+            <a:schemeClr val="dk1"/>
+          </a:fontRef>
+        </p:style>
+        <p:txBody>
+          <a:bodyPr rtlCol="0" anchor="ctr"/>
+          <a:lstStyle/>
+          <a:p>
+            <a:pPr algn="ctr"/>
+            <a:r>
+              <a:rPr lang="es-ES" sz="1400" b="1" dirty="0">
+                <a:latin typeface="Agency FB" panose="020B0503020202020204" pitchFamily="34" charset="0"/>
+              </a:rPr>
+              <a:t>Tienda de tortas</a:t>
+            </a:r>
+            <a:endParaRPr lang="es-PE" sz="1400" b="1" dirty="0">
+              <a:latin typeface="Agency FB" panose="020B0503020202020204" pitchFamily="34" charset="0"/>
+            </a:endParaRPr>
           </a:p>
         </p:txBody>
       </p:sp>
@@ -4437,7 +4434,7 @@
               <a:rPr lang="es-ES" sz="1100" dirty="0">
                 <a:latin typeface="Agency FB" panose="020B0503020202020204" pitchFamily="34" charset="0"/>
               </a:rPr>
-              <a:t>El mas barato?</a:t>
+              <a:t>El mas caro?</a:t>
             </a:r>
             <a:endParaRPr lang="es-PE" sz="1100" dirty="0">
               <a:latin typeface="Agency FB" panose="020B0503020202020204" pitchFamily="34" charset="0"/>
@@ -4712,20 +4709,20 @@
           <p:nvPr>
             <p:extLst>
               <p:ext uri="{D42A27DB-BD31-4B8C-83A1-F6EECF244321}">
-                <p14:modId xmlns:p14="http://schemas.microsoft.com/office/powerpoint/2010/main" val="1570550325"/>
+                <p14:modId xmlns:p14="http://schemas.microsoft.com/office/powerpoint/2010/main" val="46974077"/>
               </p:ext>
             </p:extLst>
           </p:nvPr>
         </p:nvGraphicFramePr>
         <p:xfrm>
-          <a:off x="1636554" y="3743287"/>
+          <a:off x="1527263" y="3703568"/>
           <a:ext cx="8128000" cy="741680"/>
         </p:xfrm>
         <a:graphic>
           <a:graphicData uri="http://schemas.openxmlformats.org/drawingml/2006/table">
             <a:tbl>
               <a:tblPr firstRow="1" bandRow="1">
-                <a:tableStyleId>{5DA37D80-6434-44D0-A028-1B22A696006F}</a:tableStyleId>
+                <a:tableStyleId>{0E3FDE45-AF77-4B5C-9715-49D594BDF05E}</a:tableStyleId>
               </a:tblPr>
               <a:tblGrid>
                 <a:gridCol w="4064000">
@@ -4751,10 +4748,16 @@
                     <a:p>
                       <a:pPr algn="ctr"/>
                       <a:r>
-                        <a:rPr lang="es-ES" dirty="0"/>
-                        <a:t>EL MAS BARATO</a:t>
+                        <a:rPr lang="es-ES" sz="1400" dirty="0"/>
+                        <a:t>EL MAS </a:t>
                       </a:r>
-                      <a:endParaRPr lang="es-PE" dirty="0"/>
+                      <a:r>
+                        <a:rPr lang="es-ES" sz="1400" b="1" dirty="0"/>
+                        <a:t>BARATO</a:t>
+                      </a:r>
+                      <a:endParaRPr lang="es-PE" sz="1400" b="1" dirty="0">
+                        <a:latin typeface="Agency FB" panose="020B0503020202020204" pitchFamily="34" charset="0"/>
+                      </a:endParaRPr>
                     </a:p>
                   </a:txBody>
                   <a:tcPr/>
@@ -4766,10 +4769,12 @@
                     <a:p>
                       <a:pPr algn="ctr"/>
                       <a:r>
-                        <a:rPr lang="es-ES" dirty="0"/>
+                        <a:rPr lang="es-ES" sz="1400" dirty="0"/>
                         <a:t>EL MAS CARO</a:t>
                       </a:r>
-                      <a:endParaRPr lang="es-PE" dirty="0"/>
+                      <a:endParaRPr lang="es-PE" sz="1400" dirty="0">
+                        <a:latin typeface="Agency FB" panose="020B0503020202020204" pitchFamily="34" charset="0"/>
+                      </a:endParaRPr>
                     </a:p>
                   </a:txBody>
                   <a:tcPr/>
@@ -4788,10 +4793,10 @@
                     <a:p>
                       <a:pPr algn="ctr"/>
                       <a:r>
-                        <a:rPr lang="es-ES" dirty="0"/>
+                        <a:rPr lang="es-ES" sz="1400" dirty="0"/>
                         <a:t>Tres Leches $85</a:t>
                       </a:r>
-                      <a:endParaRPr lang="es-PE" dirty="0"/>
+                      <a:endParaRPr lang="es-PE" sz="1400" dirty="0"/>
                     </a:p>
                   </a:txBody>
                   <a:tcPr/>
@@ -4803,10 +4808,10 @@
                     <a:p>
                       <a:pPr algn="ctr"/>
                       <a:r>
-                        <a:rPr lang="es-ES" dirty="0"/>
+                        <a:rPr lang="es-ES" sz="1400" dirty="0"/>
                         <a:t>Fresa $55</a:t>
                       </a:r>
-                      <a:endParaRPr lang="es-PE" dirty="0"/>
+                      <a:endParaRPr lang="es-PE" sz="1400" dirty="0"/>
                     </a:p>
                   </a:txBody>
                   <a:tcPr/>
@@ -4814,6 +4819,428 @@
                 <a:extLst>
                   <a:ext uri="{0D108BD9-81ED-4DB2-BD59-A6C34878D82A}">
                     <a16:rowId xmlns:a16="http://schemas.microsoft.com/office/drawing/2014/main" val="182802365"/>
+                  </a:ext>
+                </a:extLst>
+              </a:tr>
+            </a:tbl>
+          </a:graphicData>
+        </a:graphic>
+      </p:graphicFrame>
+      <p:sp>
+        <p:nvSpPr>
+          <p:cNvPr id="14" name="CuadroTexto 13">
+            <a:extLst>
+              <a:ext uri="{FF2B5EF4-FFF2-40B4-BE49-F238E27FC236}">
+                <a16:creationId xmlns:a16="http://schemas.microsoft.com/office/drawing/2014/main" id="{73B861DE-4B4B-4F6D-B15C-B913AE75CFB3}"/>
+              </a:ext>
+            </a:extLst>
+          </p:cNvPr>
+          <p:cNvSpPr txBox="1"/>
+          <p:nvPr/>
+        </p:nvSpPr>
+        <p:spPr>
+          <a:xfrm>
+            <a:off x="261108" y="5098672"/>
+            <a:ext cx="5578677" cy="830997"/>
+          </a:xfrm>
+          <a:prstGeom prst="rect">
+            <a:avLst/>
+          </a:prstGeom>
+        </p:spPr>
+        <p:style>
+          <a:lnRef idx="2">
+            <a:schemeClr val="accent2"/>
+          </a:lnRef>
+          <a:fillRef idx="1">
+            <a:schemeClr val="lt1"/>
+          </a:fillRef>
+          <a:effectRef idx="0">
+            <a:schemeClr val="accent2"/>
+          </a:effectRef>
+          <a:fontRef idx="minor">
+            <a:schemeClr val="dk1"/>
+          </a:fontRef>
+        </p:style>
+        <p:txBody>
+          <a:bodyPr wrap="square" rtlCol="0">
+            <a:spAutoFit/>
+          </a:bodyPr>
+          <a:lstStyle/>
+          <a:p>
+            <a:r>
+              <a:rPr lang="es-ES" sz="1200" b="0" i="0" dirty="0">
+                <a:solidFill>
+                  <a:srgbClr val="2E2F30"/>
+                </a:solidFill>
+                <a:effectLst/>
+                <a:latin typeface="Inter"/>
+              </a:rPr>
+              <a:t>Este algoritmo funciona encontrando repetidamente el elemento más pequeño de la lista y colocándolo al principio. Luego, se toma el siguiente elemento más pequeño y se coloca en la segunda posición, y así sucesivamente hasta que todos los elementos estén ordenados.</a:t>
+            </a:r>
+            <a:endParaRPr lang="es-PE" sz="1200" dirty="0"/>
+          </a:p>
+        </p:txBody>
+      </p:sp>
+      <p:sp>
+        <p:nvSpPr>
+          <p:cNvPr id="24" name="CuadroTexto 23">
+            <a:extLst>
+              <a:ext uri="{FF2B5EF4-FFF2-40B4-BE49-F238E27FC236}">
+                <a16:creationId xmlns:a16="http://schemas.microsoft.com/office/drawing/2014/main" id="{BA6899EA-2BCA-482C-8B41-B6C3768BE8E8}"/>
+              </a:ext>
+            </a:extLst>
+          </p:cNvPr>
+          <p:cNvSpPr txBox="1"/>
+          <p:nvPr/>
+        </p:nvSpPr>
+        <p:spPr>
+          <a:xfrm>
+            <a:off x="5951990" y="5084836"/>
+            <a:ext cx="5775819" cy="1169551"/>
+          </a:xfrm>
+          <a:prstGeom prst="rect">
+            <a:avLst/>
+          </a:prstGeom>
+        </p:spPr>
+        <p:style>
+          <a:lnRef idx="2">
+            <a:schemeClr val="accent2"/>
+          </a:lnRef>
+          <a:fillRef idx="1">
+            <a:schemeClr val="lt1"/>
+          </a:fillRef>
+          <a:effectRef idx="0">
+            <a:schemeClr val="accent2"/>
+          </a:effectRef>
+          <a:fontRef idx="minor">
+            <a:schemeClr val="dk1"/>
+          </a:fontRef>
+        </p:style>
+        <p:txBody>
+          <a:bodyPr wrap="square">
+            <a:spAutoFit/>
+          </a:bodyPr>
+          <a:lstStyle/>
+          <a:p>
+            <a:r>
+              <a:rPr lang="es-ES" sz="1400" dirty="0">
+                <a:latin typeface="Agency FB" panose="020B0503020202020204" pitchFamily="34" charset="0"/>
+              </a:rPr>
+              <a:t>1. Inicialmente, se considera que toda la lista está desordenada.</a:t>
+            </a:r>
+          </a:p>
+          <a:p>
+            <a:r>
+              <a:rPr lang="es-ES" sz="1400" dirty="0">
+                <a:latin typeface="Agency FB" panose="020B0503020202020204" pitchFamily="34" charset="0"/>
+              </a:rPr>
+              <a:t>2. Se busca el elemento más pequeño en la lista y se intercambia con el primer elemento.</a:t>
+            </a:r>
+          </a:p>
+          <a:p>
+            <a:r>
+              <a:rPr lang="es-ES" sz="1400" dirty="0">
+                <a:latin typeface="Agency FB" panose="020B0503020202020204" pitchFamily="34" charset="0"/>
+              </a:rPr>
+              <a:t>3. Se considera que el primer elemento está ordenado y se continúa buscando el elemento más pequeño en la lista restante.</a:t>
+            </a:r>
+          </a:p>
+          <a:p>
+            <a:r>
+              <a:rPr lang="es-ES" sz="1400" dirty="0">
+                <a:latin typeface="Agency FB" panose="020B0503020202020204" pitchFamily="34" charset="0"/>
+              </a:rPr>
+              <a:t>4. Se repiten los pasos 2 y 3 hasta que todos los elementos estén en su posición correcta.</a:t>
+            </a:r>
+            <a:endParaRPr lang="es-PE" sz="1400" dirty="0">
+              <a:latin typeface="Agency FB" panose="020B0503020202020204" pitchFamily="34" charset="0"/>
+            </a:endParaRPr>
+          </a:p>
+        </p:txBody>
+      </p:sp>
+      <p:graphicFrame>
+        <p:nvGraphicFramePr>
+          <p:cNvPr id="22" name="Tabla 24">
+            <a:extLst>
+              <a:ext uri="{FF2B5EF4-FFF2-40B4-BE49-F238E27FC236}">
+                <a16:creationId xmlns:a16="http://schemas.microsoft.com/office/drawing/2014/main" id="{B0F0D2F3-CB67-4780-BA29-5A5AA077BF54}"/>
+              </a:ext>
+            </a:extLst>
+          </p:cNvPr>
+          <p:cNvGraphicFramePr>
+            <a:graphicFrameLocks noGrp="1"/>
+          </p:cNvGraphicFramePr>
+          <p:nvPr>
+            <p:extLst>
+              <p:ext uri="{D42A27DB-BD31-4B8C-83A1-F6EECF244321}">
+                <p14:modId xmlns:p14="http://schemas.microsoft.com/office/powerpoint/2010/main" val="2580581757"/>
+              </p:ext>
+            </p:extLst>
+          </p:nvPr>
+        </p:nvGraphicFramePr>
+        <p:xfrm>
+          <a:off x="9596395" y="1496738"/>
+          <a:ext cx="2285562" cy="1854200"/>
+        </p:xfrm>
+        <a:graphic>
+          <a:graphicData uri="http://schemas.openxmlformats.org/drawingml/2006/table">
+            <a:tbl>
+              <a:tblPr firstRow="1" bandRow="1">
+                <a:tableStyleId>{0E3FDE45-AF77-4B5C-9715-49D594BDF05E}</a:tableStyleId>
+              </a:tblPr>
+              <a:tblGrid>
+                <a:gridCol w="1142781">
+                  <a:extLst>
+                    <a:ext uri="{9D8B030D-6E8A-4147-A177-3AD203B41FA5}">
+                      <a16:colId xmlns:a16="http://schemas.microsoft.com/office/drawing/2014/main" val="283265732"/>
+                    </a:ext>
+                  </a:extLst>
+                </a:gridCol>
+                <a:gridCol w="1142781">
+                  <a:extLst>
+                    <a:ext uri="{9D8B030D-6E8A-4147-A177-3AD203B41FA5}">
+                      <a16:colId xmlns:a16="http://schemas.microsoft.com/office/drawing/2014/main" val="3127997811"/>
+                    </a:ext>
+                  </a:extLst>
+                </a:gridCol>
+              </a:tblGrid>
+              <a:tr h="370840">
+                <a:tc>
+                  <a:txBody>
+                    <a:bodyPr/>
+                    <a:lstStyle/>
+                    <a:p>
+                      <a:pPr algn="ctr"/>
+                      <a:r>
+                        <a:rPr lang="es-ES" sz="1400" dirty="0"/>
+                        <a:t>Pastel</a:t>
+                      </a:r>
+                      <a:endParaRPr lang="es-PE" sz="1400" dirty="0">
+                        <a:latin typeface="Agency FB" panose="020B0503020202020204" pitchFamily="34" charset="0"/>
+                      </a:endParaRPr>
+                    </a:p>
+                  </a:txBody>
+                  <a:tcPr/>
+                </a:tc>
+                <a:tc>
+                  <a:txBody>
+                    <a:bodyPr/>
+                    <a:lstStyle/>
+                    <a:p>
+                      <a:pPr algn="ctr"/>
+                      <a:r>
+                        <a:rPr lang="es-ES" sz="1400" dirty="0"/>
+                        <a:t>Precio $</a:t>
+                      </a:r>
+                      <a:endParaRPr lang="es-PE" sz="1400" dirty="0">
+                        <a:latin typeface="Agency FB" panose="020B0503020202020204" pitchFamily="34" charset="0"/>
+                      </a:endParaRPr>
+                    </a:p>
+                  </a:txBody>
+                  <a:tcPr/>
+                </a:tc>
+                <a:extLst>
+                  <a:ext uri="{0D108BD9-81ED-4DB2-BD59-A6C34878D82A}">
+                    <a16:rowId xmlns:a16="http://schemas.microsoft.com/office/drawing/2014/main" val="3690535212"/>
+                  </a:ext>
+                </a:extLst>
+              </a:tr>
+              <a:tr h="370840">
+                <a:tc>
+                  <a:txBody>
+                    <a:bodyPr/>
+                    <a:lstStyle/>
+                    <a:p>
+                      <a:r>
+                        <a:rPr lang="es-ES" sz="1400" dirty="0"/>
+                        <a:t>Tres leches</a:t>
+                      </a:r>
+                      <a:endParaRPr lang="es-PE" sz="1400" dirty="0">
+                        <a:latin typeface="Agency FB" panose="020B0503020202020204" pitchFamily="34" charset="0"/>
+                      </a:endParaRPr>
+                    </a:p>
+                  </a:txBody>
+                  <a:tcPr/>
+                </a:tc>
+                <a:tc>
+                  <a:txBody>
+                    <a:bodyPr/>
+                    <a:lstStyle/>
+                    <a:p>
+                      <a:r>
+                        <a:rPr lang="es-ES" sz="1400" dirty="0"/>
+                        <a:t>$85</a:t>
+                      </a:r>
+                      <a:endParaRPr lang="es-PE" sz="1400" dirty="0"/>
+                    </a:p>
+                  </a:txBody>
+                  <a:tcPr/>
+                </a:tc>
+                <a:extLst>
+                  <a:ext uri="{0D108BD9-81ED-4DB2-BD59-A6C34878D82A}">
+                    <a16:rowId xmlns:a16="http://schemas.microsoft.com/office/drawing/2014/main" val="3646407730"/>
+                  </a:ext>
+                </a:extLst>
+              </a:tr>
+              <a:tr h="370840">
+                <a:tc>
+                  <a:txBody>
+                    <a:bodyPr/>
+                    <a:lstStyle/>
+                    <a:p>
+                      <a:r>
+                        <a:rPr lang="es-ES" sz="1400" dirty="0"/>
+                        <a:t>Vainilla</a:t>
+                      </a:r>
+                      <a:endParaRPr lang="es-PE" sz="1400" dirty="0">
+                        <a:latin typeface="Agency FB" panose="020B0503020202020204" pitchFamily="34" charset="0"/>
+                      </a:endParaRPr>
+                    </a:p>
+                  </a:txBody>
+                  <a:tcPr/>
+                </a:tc>
+                <a:tc>
+                  <a:txBody>
+                    <a:bodyPr/>
+                    <a:lstStyle/>
+                    <a:p>
+                      <a:pPr marL="0" marR="0" lvl="0" indent="0" algn="l" defTabSz="914400" rtl="0" eaLnBrk="1" fontAlgn="auto" latinLnBrk="0" hangingPunct="1">
+                        <a:lnSpc>
+                          <a:spcPct val="100000"/>
+                        </a:lnSpc>
+                        <a:spcBef>
+                          <a:spcPts val="0"/>
+                        </a:spcBef>
+                        <a:spcAft>
+                          <a:spcPts val="0"/>
+                        </a:spcAft>
+                        <a:buClrTx/>
+                        <a:buSzTx/>
+                        <a:buFontTx/>
+                        <a:buNone/>
+                        <a:tabLst/>
+                        <a:defRPr/>
+                      </a:pPr>
+                      <a:r>
+                        <a:rPr lang="es-ES" sz="1400" dirty="0"/>
+                        <a:t>$65</a:t>
+                      </a:r>
+                      <a:endParaRPr lang="es-PE" sz="1400" dirty="0"/>
+                    </a:p>
+                  </a:txBody>
+                  <a:tcPr/>
+                </a:tc>
+                <a:extLst>
+                  <a:ext uri="{0D108BD9-81ED-4DB2-BD59-A6C34878D82A}">
+                    <a16:rowId xmlns:a16="http://schemas.microsoft.com/office/drawing/2014/main" val="1613884338"/>
+                  </a:ext>
+                </a:extLst>
+              </a:tr>
+              <a:tr h="370840">
+                <a:tc>
+                  <a:txBody>
+                    <a:bodyPr/>
+                    <a:lstStyle/>
+                    <a:p>
+                      <a:r>
+                        <a:rPr lang="es-ES" sz="1400" dirty="0"/>
+                        <a:t>Chocolate</a:t>
+                      </a:r>
+                      <a:endParaRPr lang="es-PE" sz="1400" dirty="0">
+                        <a:latin typeface="Agency FB" panose="020B0503020202020204" pitchFamily="34" charset="0"/>
+                      </a:endParaRPr>
+                    </a:p>
+                  </a:txBody>
+                  <a:tcPr/>
+                </a:tc>
+                <a:tc>
+                  <a:txBody>
+                    <a:bodyPr/>
+                    <a:lstStyle/>
+                    <a:p>
+                      <a:pPr marL="0" marR="0" lvl="0" indent="0" algn="l" defTabSz="914400" rtl="0" eaLnBrk="1" fontAlgn="auto" latinLnBrk="0" hangingPunct="1">
+                        <a:lnSpc>
+                          <a:spcPct val="100000"/>
+                        </a:lnSpc>
+                        <a:spcBef>
+                          <a:spcPts val="0"/>
+                        </a:spcBef>
+                        <a:spcAft>
+                          <a:spcPts val="0"/>
+                        </a:spcAft>
+                        <a:buClrTx/>
+                        <a:buSzTx/>
+                        <a:buFontTx/>
+                        <a:buNone/>
+                        <a:tabLst/>
+                        <a:defRPr/>
+                      </a:pPr>
+                      <a:r>
+                        <a:rPr lang="es-ES" sz="1400" dirty="0"/>
+                        <a:t>$60</a:t>
+                      </a:r>
+                      <a:endParaRPr lang="es-PE" sz="1400" dirty="0"/>
+                    </a:p>
+                  </a:txBody>
+                  <a:tcPr/>
+                </a:tc>
+                <a:extLst>
+                  <a:ext uri="{0D108BD9-81ED-4DB2-BD59-A6C34878D82A}">
+                    <a16:rowId xmlns:a16="http://schemas.microsoft.com/office/drawing/2014/main" val="4055263340"/>
+                  </a:ext>
+                </a:extLst>
+              </a:tr>
+              <a:tr h="370840">
+                <a:tc>
+                  <a:txBody>
+                    <a:bodyPr/>
+                    <a:lstStyle/>
+                    <a:p>
+                      <a:r>
+                        <a:rPr lang="es-ES" sz="1400" dirty="0"/>
+                        <a:t>Fresa</a:t>
+                      </a:r>
+                      <a:endParaRPr lang="es-PE" sz="1400" dirty="0">
+                        <a:latin typeface="Agency FB" panose="020B0503020202020204" pitchFamily="34" charset="0"/>
+                      </a:endParaRPr>
+                    </a:p>
+                  </a:txBody>
+                  <a:tcPr/>
+                </a:tc>
+                <a:tc>
+                  <a:txBody>
+                    <a:bodyPr/>
+                    <a:lstStyle/>
+                    <a:p>
+                      <a:pPr marL="0" marR="0" lvl="0" indent="0" algn="l" defTabSz="914400" rtl="0" eaLnBrk="1" fontAlgn="auto" latinLnBrk="0" hangingPunct="1">
+                        <a:lnSpc>
+                          <a:spcPct val="100000"/>
+                        </a:lnSpc>
+                        <a:spcBef>
+                          <a:spcPts val="0"/>
+                        </a:spcBef>
+                        <a:spcAft>
+                          <a:spcPts val="0"/>
+                        </a:spcAft>
+                        <a:buClrTx/>
+                        <a:buSzTx/>
+                        <a:buFontTx/>
+                        <a:buNone/>
+                        <a:tabLst/>
+                        <a:defRPr/>
+                      </a:pPr>
+                      <a:r>
+                        <a:rPr lang="es-ES" sz="1400" dirty="0"/>
+                        <a:t>$55</a:t>
+                      </a:r>
+                      <a:endParaRPr lang="es-PE" sz="1400" dirty="0"/>
+                    </a:p>
+                  </a:txBody>
+                  <a:tcPr/>
+                </a:tc>
+                <a:extLst>
+                  <a:ext uri="{0D108BD9-81ED-4DB2-BD59-A6C34878D82A}">
+                    <a16:rowId xmlns:a16="http://schemas.microsoft.com/office/drawing/2014/main" val="1729513978"/>
                   </a:ext>
                 </a:extLst>
               </a:tr>
@@ -4831,6 +5258,1292 @@
   <p:clrMapOvr>
     <a:masterClrMapping/>
   </p:clrMapOvr>
+  <mc:AlternateContent xmlns:mc="http://schemas.openxmlformats.org/markup-compatibility/2006">
+    <mc:Choice xmlns:p14="http://schemas.microsoft.com/office/powerpoint/2010/main" Requires="p14">
+      <p:transition spd="slow" p14:dur="3400">
+        <p14:reveal/>
+      </p:transition>
+    </mc:Choice>
+    <mc:Fallback>
+      <p:transition spd="slow">
+        <p:fade/>
+      </p:transition>
+    </mc:Fallback>
+  </mc:AlternateContent>
+  <p:timing>
+    <p:tnLst>
+      <p:par>
+        <p:cTn id="1" dur="indefinite" restart="never" nodeType="tmRoot">
+          <p:childTnLst>
+            <p:seq concurrent="1" nextAc="seek">
+              <p:cTn id="2" dur="indefinite" nodeType="mainSeq">
+                <p:childTnLst>
+                  <p:par>
+                    <p:cTn id="3" fill="hold">
+                      <p:stCondLst>
+                        <p:cond delay="indefinite"/>
+                      </p:stCondLst>
+                      <p:childTnLst>
+                        <p:par>
+                          <p:cTn id="4" fill="hold">
+                            <p:stCondLst>
+                              <p:cond delay="0"/>
+                            </p:stCondLst>
+                            <p:childTnLst>
+                              <p:par>
+                                <p:cTn id="5" presetID="10" presetClass="entr" presetSubtype="0" fill="hold" grpId="0" nodeType="clickEffect">
+                                  <p:stCondLst>
+                                    <p:cond delay="0"/>
+                                  </p:stCondLst>
+                                  <p:childTnLst>
+                                    <p:set>
+                                      <p:cBhvr>
+                                        <p:cTn id="6" dur="1" fill="hold">
+                                          <p:stCondLst>
+                                            <p:cond delay="0"/>
+                                          </p:stCondLst>
+                                        </p:cTn>
+                                        <p:tgtEl>
+                                          <p:spTgt spid="14"/>
+                                        </p:tgtEl>
+                                        <p:attrNameLst>
+                                          <p:attrName>style.visibility</p:attrName>
+                                        </p:attrNameLst>
+                                      </p:cBhvr>
+                                      <p:to>
+                                        <p:strVal val="visible"/>
+                                      </p:to>
+                                    </p:set>
+                                    <p:animEffect transition="in" filter="fade">
+                                      <p:cBhvr>
+                                        <p:cTn id="7" dur="500"/>
+                                        <p:tgtEl>
+                                          <p:spTgt spid="14"/>
+                                        </p:tgtEl>
+                                      </p:cBhvr>
+                                    </p:animEffect>
+                                  </p:childTnLst>
+                                </p:cTn>
+                              </p:par>
+                            </p:childTnLst>
+                          </p:cTn>
+                        </p:par>
+                      </p:childTnLst>
+                    </p:cTn>
+                  </p:par>
+                  <p:par>
+                    <p:cTn id="8" fill="hold">
+                      <p:stCondLst>
+                        <p:cond delay="indefinite"/>
+                      </p:stCondLst>
+                      <p:childTnLst>
+                        <p:par>
+                          <p:cTn id="9" fill="hold">
+                            <p:stCondLst>
+                              <p:cond delay="0"/>
+                            </p:stCondLst>
+                            <p:childTnLst>
+                              <p:par>
+                                <p:cTn id="10" presetID="10" presetClass="entr" presetSubtype="0" fill="hold" grpId="0" nodeType="clickEffect">
+                                  <p:stCondLst>
+                                    <p:cond delay="0"/>
+                                  </p:stCondLst>
+                                  <p:childTnLst>
+                                    <p:set>
+                                      <p:cBhvr>
+                                        <p:cTn id="11" dur="1" fill="hold">
+                                          <p:stCondLst>
+                                            <p:cond delay="0"/>
+                                          </p:stCondLst>
+                                        </p:cTn>
+                                        <p:tgtEl>
+                                          <p:spTgt spid="11"/>
+                                        </p:tgtEl>
+                                        <p:attrNameLst>
+                                          <p:attrName>style.visibility</p:attrName>
+                                        </p:attrNameLst>
+                                      </p:cBhvr>
+                                      <p:to>
+                                        <p:strVal val="visible"/>
+                                      </p:to>
+                                    </p:set>
+                                    <p:animEffect transition="in" filter="fade">
+                                      <p:cBhvr>
+                                        <p:cTn id="12" dur="500"/>
+                                        <p:tgtEl>
+                                          <p:spTgt spid="11"/>
+                                        </p:tgtEl>
+                                      </p:cBhvr>
+                                    </p:animEffect>
+                                  </p:childTnLst>
+                                </p:cTn>
+                              </p:par>
+                            </p:childTnLst>
+                          </p:cTn>
+                        </p:par>
+                      </p:childTnLst>
+                    </p:cTn>
+                  </p:par>
+                  <p:par>
+                    <p:cTn id="13" fill="hold">
+                      <p:stCondLst>
+                        <p:cond delay="indefinite"/>
+                      </p:stCondLst>
+                      <p:childTnLst>
+                        <p:par>
+                          <p:cTn id="14" fill="hold">
+                            <p:stCondLst>
+                              <p:cond delay="0"/>
+                            </p:stCondLst>
+                            <p:childTnLst>
+                              <p:par>
+                                <p:cTn id="15" presetID="10" presetClass="entr" presetSubtype="0" fill="hold" grpId="0" nodeType="clickEffect">
+                                  <p:stCondLst>
+                                    <p:cond delay="0"/>
+                                  </p:stCondLst>
+                                  <p:childTnLst>
+                                    <p:set>
+                                      <p:cBhvr>
+                                        <p:cTn id="16" dur="1" fill="hold">
+                                          <p:stCondLst>
+                                            <p:cond delay="0"/>
+                                          </p:stCondLst>
+                                        </p:cTn>
+                                        <p:tgtEl>
+                                          <p:spTgt spid="12"/>
+                                        </p:tgtEl>
+                                        <p:attrNameLst>
+                                          <p:attrName>style.visibility</p:attrName>
+                                        </p:attrNameLst>
+                                      </p:cBhvr>
+                                      <p:to>
+                                        <p:strVal val="visible"/>
+                                      </p:to>
+                                    </p:set>
+                                    <p:animEffect transition="in" filter="fade">
+                                      <p:cBhvr>
+                                        <p:cTn id="17" dur="500"/>
+                                        <p:tgtEl>
+                                          <p:spTgt spid="12"/>
+                                        </p:tgtEl>
+                                      </p:cBhvr>
+                                    </p:animEffect>
+                                  </p:childTnLst>
+                                </p:cTn>
+                              </p:par>
+                            </p:childTnLst>
+                          </p:cTn>
+                        </p:par>
+                      </p:childTnLst>
+                    </p:cTn>
+                  </p:par>
+                  <p:par>
+                    <p:cTn id="18" fill="hold">
+                      <p:stCondLst>
+                        <p:cond delay="indefinite"/>
+                      </p:stCondLst>
+                      <p:childTnLst>
+                        <p:par>
+                          <p:cTn id="19" fill="hold">
+                            <p:stCondLst>
+                              <p:cond delay="0"/>
+                            </p:stCondLst>
+                            <p:childTnLst>
+                              <p:par>
+                                <p:cTn id="20" presetID="10" presetClass="entr" presetSubtype="0" fill="hold" grpId="0" nodeType="clickEffect">
+                                  <p:stCondLst>
+                                    <p:cond delay="0"/>
+                                  </p:stCondLst>
+                                  <p:childTnLst>
+                                    <p:set>
+                                      <p:cBhvr>
+                                        <p:cTn id="21" dur="1" fill="hold">
+                                          <p:stCondLst>
+                                            <p:cond delay="0"/>
+                                          </p:stCondLst>
+                                        </p:cTn>
+                                        <p:tgtEl>
+                                          <p:spTgt spid="13"/>
+                                        </p:tgtEl>
+                                        <p:attrNameLst>
+                                          <p:attrName>style.visibility</p:attrName>
+                                        </p:attrNameLst>
+                                      </p:cBhvr>
+                                      <p:to>
+                                        <p:strVal val="visible"/>
+                                      </p:to>
+                                    </p:set>
+                                    <p:animEffect transition="in" filter="fade">
+                                      <p:cBhvr>
+                                        <p:cTn id="22" dur="500"/>
+                                        <p:tgtEl>
+                                          <p:spTgt spid="13"/>
+                                        </p:tgtEl>
+                                      </p:cBhvr>
+                                    </p:animEffect>
+                                  </p:childTnLst>
+                                </p:cTn>
+                              </p:par>
+                            </p:childTnLst>
+                          </p:cTn>
+                        </p:par>
+                      </p:childTnLst>
+                    </p:cTn>
+                  </p:par>
+                  <p:par>
+                    <p:cTn id="23" fill="hold">
+                      <p:stCondLst>
+                        <p:cond delay="indefinite"/>
+                      </p:stCondLst>
+                      <p:childTnLst>
+                        <p:par>
+                          <p:cTn id="24" fill="hold">
+                            <p:stCondLst>
+                              <p:cond delay="0"/>
+                            </p:stCondLst>
+                            <p:childTnLst>
+                              <p:par>
+                                <p:cTn id="25" presetID="10" presetClass="entr" presetSubtype="0" fill="hold" grpId="0" nodeType="clickEffect">
+                                  <p:stCondLst>
+                                    <p:cond delay="0"/>
+                                  </p:stCondLst>
+                                  <p:childTnLst>
+                                    <p:set>
+                                      <p:cBhvr>
+                                        <p:cTn id="26" dur="1" fill="hold">
+                                          <p:stCondLst>
+                                            <p:cond delay="0"/>
+                                          </p:stCondLst>
+                                        </p:cTn>
+                                        <p:tgtEl>
+                                          <p:spTgt spid="15"/>
+                                        </p:tgtEl>
+                                        <p:attrNameLst>
+                                          <p:attrName>style.visibility</p:attrName>
+                                        </p:attrNameLst>
+                                      </p:cBhvr>
+                                      <p:to>
+                                        <p:strVal val="visible"/>
+                                      </p:to>
+                                    </p:set>
+                                    <p:animEffect transition="in" filter="fade">
+                                      <p:cBhvr>
+                                        <p:cTn id="27" dur="500"/>
+                                        <p:tgtEl>
+                                          <p:spTgt spid="15"/>
+                                        </p:tgtEl>
+                                      </p:cBhvr>
+                                    </p:animEffect>
+                                  </p:childTnLst>
+                                </p:cTn>
+                              </p:par>
+                            </p:childTnLst>
+                          </p:cTn>
+                        </p:par>
+                      </p:childTnLst>
+                    </p:cTn>
+                  </p:par>
+                  <p:par>
+                    <p:cTn id="28" fill="hold">
+                      <p:stCondLst>
+                        <p:cond delay="indefinite"/>
+                      </p:stCondLst>
+                      <p:childTnLst>
+                        <p:par>
+                          <p:cTn id="29" fill="hold">
+                            <p:stCondLst>
+                              <p:cond delay="0"/>
+                            </p:stCondLst>
+                            <p:childTnLst>
+                              <p:par>
+                                <p:cTn id="30" presetID="10" presetClass="entr" presetSubtype="0" fill="hold" grpId="0" nodeType="clickEffect">
+                                  <p:stCondLst>
+                                    <p:cond delay="0"/>
+                                  </p:stCondLst>
+                                  <p:childTnLst>
+                                    <p:set>
+                                      <p:cBhvr>
+                                        <p:cTn id="31" dur="1" fill="hold">
+                                          <p:stCondLst>
+                                            <p:cond delay="0"/>
+                                          </p:stCondLst>
+                                        </p:cTn>
+                                        <p:tgtEl>
+                                          <p:spTgt spid="16"/>
+                                        </p:tgtEl>
+                                        <p:attrNameLst>
+                                          <p:attrName>style.visibility</p:attrName>
+                                        </p:attrNameLst>
+                                      </p:cBhvr>
+                                      <p:to>
+                                        <p:strVal val="visible"/>
+                                      </p:to>
+                                    </p:set>
+                                    <p:animEffect transition="in" filter="fade">
+                                      <p:cBhvr>
+                                        <p:cTn id="32" dur="500"/>
+                                        <p:tgtEl>
+                                          <p:spTgt spid="16"/>
+                                        </p:tgtEl>
+                                      </p:cBhvr>
+                                    </p:animEffect>
+                                  </p:childTnLst>
+                                </p:cTn>
+                              </p:par>
+                            </p:childTnLst>
+                          </p:cTn>
+                        </p:par>
+                      </p:childTnLst>
+                    </p:cTn>
+                  </p:par>
+                  <p:par>
+                    <p:cTn id="33" fill="hold">
+                      <p:stCondLst>
+                        <p:cond delay="indefinite"/>
+                      </p:stCondLst>
+                      <p:childTnLst>
+                        <p:par>
+                          <p:cTn id="34" fill="hold">
+                            <p:stCondLst>
+                              <p:cond delay="0"/>
+                            </p:stCondLst>
+                            <p:childTnLst>
+                              <p:par>
+                                <p:cTn id="35" presetID="10" presetClass="entr" presetSubtype="0" fill="hold" grpId="0" nodeType="clickEffect">
+                                  <p:stCondLst>
+                                    <p:cond delay="0"/>
+                                  </p:stCondLst>
+                                  <p:childTnLst>
+                                    <p:set>
+                                      <p:cBhvr>
+                                        <p:cTn id="36" dur="1" fill="hold">
+                                          <p:stCondLst>
+                                            <p:cond delay="0"/>
+                                          </p:stCondLst>
+                                        </p:cTn>
+                                        <p:tgtEl>
+                                          <p:spTgt spid="17"/>
+                                        </p:tgtEl>
+                                        <p:attrNameLst>
+                                          <p:attrName>style.visibility</p:attrName>
+                                        </p:attrNameLst>
+                                      </p:cBhvr>
+                                      <p:to>
+                                        <p:strVal val="visible"/>
+                                      </p:to>
+                                    </p:set>
+                                    <p:animEffect transition="in" filter="fade">
+                                      <p:cBhvr>
+                                        <p:cTn id="37" dur="500"/>
+                                        <p:tgtEl>
+                                          <p:spTgt spid="17"/>
+                                        </p:tgtEl>
+                                      </p:cBhvr>
+                                    </p:animEffect>
+                                  </p:childTnLst>
+                                </p:cTn>
+                              </p:par>
+                            </p:childTnLst>
+                          </p:cTn>
+                        </p:par>
+                      </p:childTnLst>
+                    </p:cTn>
+                  </p:par>
+                  <p:par>
+                    <p:cTn id="38" fill="hold">
+                      <p:stCondLst>
+                        <p:cond delay="indefinite"/>
+                      </p:stCondLst>
+                      <p:childTnLst>
+                        <p:par>
+                          <p:cTn id="39" fill="hold">
+                            <p:stCondLst>
+                              <p:cond delay="0"/>
+                            </p:stCondLst>
+                            <p:childTnLst>
+                              <p:par>
+                                <p:cTn id="40" presetID="10" presetClass="entr" presetSubtype="0" fill="hold" grpId="0" nodeType="clickEffect">
+                                  <p:stCondLst>
+                                    <p:cond delay="0"/>
+                                  </p:stCondLst>
+                                  <p:childTnLst>
+                                    <p:set>
+                                      <p:cBhvr>
+                                        <p:cTn id="41" dur="1" fill="hold">
+                                          <p:stCondLst>
+                                            <p:cond delay="0"/>
+                                          </p:stCondLst>
+                                        </p:cTn>
+                                        <p:tgtEl>
+                                          <p:spTgt spid="7"/>
+                                        </p:tgtEl>
+                                        <p:attrNameLst>
+                                          <p:attrName>style.visibility</p:attrName>
+                                        </p:attrNameLst>
+                                      </p:cBhvr>
+                                      <p:to>
+                                        <p:strVal val="visible"/>
+                                      </p:to>
+                                    </p:set>
+                                    <p:animEffect transition="in" filter="fade">
+                                      <p:cBhvr>
+                                        <p:cTn id="42" dur="500"/>
+                                        <p:tgtEl>
+                                          <p:spTgt spid="7"/>
+                                        </p:tgtEl>
+                                      </p:cBhvr>
+                                    </p:animEffect>
+                                  </p:childTnLst>
+                                </p:cTn>
+                              </p:par>
+                            </p:childTnLst>
+                          </p:cTn>
+                        </p:par>
+                      </p:childTnLst>
+                    </p:cTn>
+                  </p:par>
+                  <p:par>
+                    <p:cTn id="43" fill="hold">
+                      <p:stCondLst>
+                        <p:cond delay="indefinite"/>
+                      </p:stCondLst>
+                      <p:childTnLst>
+                        <p:par>
+                          <p:cTn id="44" fill="hold">
+                            <p:stCondLst>
+                              <p:cond delay="0"/>
+                            </p:stCondLst>
+                            <p:childTnLst>
+                              <p:par>
+                                <p:cTn id="45" presetID="10" presetClass="entr" presetSubtype="0" fill="hold" nodeType="clickEffect">
+                                  <p:stCondLst>
+                                    <p:cond delay="0"/>
+                                  </p:stCondLst>
+                                  <p:childTnLst>
+                                    <p:set>
+                                      <p:cBhvr>
+                                        <p:cTn id="46" dur="1" fill="hold">
+                                          <p:stCondLst>
+                                            <p:cond delay="0"/>
+                                          </p:stCondLst>
+                                        </p:cTn>
+                                        <p:tgtEl>
+                                          <p:spTgt spid="6"/>
+                                        </p:tgtEl>
+                                        <p:attrNameLst>
+                                          <p:attrName>style.visibility</p:attrName>
+                                        </p:attrNameLst>
+                                      </p:cBhvr>
+                                      <p:to>
+                                        <p:strVal val="visible"/>
+                                      </p:to>
+                                    </p:set>
+                                    <p:animEffect transition="in" filter="fade">
+                                      <p:cBhvr>
+                                        <p:cTn id="47" dur="500"/>
+                                        <p:tgtEl>
+                                          <p:spTgt spid="6"/>
+                                        </p:tgtEl>
+                                      </p:cBhvr>
+                                    </p:animEffect>
+                                  </p:childTnLst>
+                                </p:cTn>
+                              </p:par>
+                            </p:childTnLst>
+                          </p:cTn>
+                        </p:par>
+                      </p:childTnLst>
+                    </p:cTn>
+                  </p:par>
+                  <p:par>
+                    <p:cTn id="48" fill="hold">
+                      <p:stCondLst>
+                        <p:cond delay="indefinite"/>
+                      </p:stCondLst>
+                      <p:childTnLst>
+                        <p:par>
+                          <p:cTn id="49" fill="hold">
+                            <p:stCondLst>
+                              <p:cond delay="0"/>
+                            </p:stCondLst>
+                            <p:childTnLst>
+                              <p:par>
+                                <p:cTn id="50" presetID="10" presetClass="entr" presetSubtype="0" fill="hold" nodeType="clickEffect">
+                                  <p:stCondLst>
+                                    <p:cond delay="0"/>
+                                  </p:stCondLst>
+                                  <p:childTnLst>
+                                    <p:set>
+                                      <p:cBhvr>
+                                        <p:cTn id="51" dur="1" fill="hold">
+                                          <p:stCondLst>
+                                            <p:cond delay="0"/>
+                                          </p:stCondLst>
+                                        </p:cTn>
+                                        <p:tgtEl>
+                                          <p:spTgt spid="5"/>
+                                        </p:tgtEl>
+                                        <p:attrNameLst>
+                                          <p:attrName>style.visibility</p:attrName>
+                                        </p:attrNameLst>
+                                      </p:cBhvr>
+                                      <p:to>
+                                        <p:strVal val="visible"/>
+                                      </p:to>
+                                    </p:set>
+                                    <p:animEffect transition="in" filter="fade">
+                                      <p:cBhvr>
+                                        <p:cTn id="52" dur="500"/>
+                                        <p:tgtEl>
+                                          <p:spTgt spid="5"/>
+                                        </p:tgtEl>
+                                      </p:cBhvr>
+                                    </p:animEffect>
+                                  </p:childTnLst>
+                                </p:cTn>
+                              </p:par>
+                            </p:childTnLst>
+                          </p:cTn>
+                        </p:par>
+                      </p:childTnLst>
+                    </p:cTn>
+                  </p:par>
+                  <p:par>
+                    <p:cTn id="53" fill="hold">
+                      <p:stCondLst>
+                        <p:cond delay="indefinite"/>
+                      </p:stCondLst>
+                      <p:childTnLst>
+                        <p:par>
+                          <p:cTn id="54" fill="hold">
+                            <p:stCondLst>
+                              <p:cond delay="0"/>
+                            </p:stCondLst>
+                            <p:childTnLst>
+                              <p:par>
+                                <p:cTn id="55" presetID="10" presetClass="entr" presetSubtype="0" fill="hold" nodeType="clickEffect">
+                                  <p:stCondLst>
+                                    <p:cond delay="0"/>
+                                  </p:stCondLst>
+                                  <p:childTnLst>
+                                    <p:set>
+                                      <p:cBhvr>
+                                        <p:cTn id="56" dur="1" fill="hold">
+                                          <p:stCondLst>
+                                            <p:cond delay="0"/>
+                                          </p:stCondLst>
+                                        </p:cTn>
+                                        <p:tgtEl>
+                                          <p:spTgt spid="4"/>
+                                        </p:tgtEl>
+                                        <p:attrNameLst>
+                                          <p:attrName>style.visibility</p:attrName>
+                                        </p:attrNameLst>
+                                      </p:cBhvr>
+                                      <p:to>
+                                        <p:strVal val="visible"/>
+                                      </p:to>
+                                    </p:set>
+                                    <p:animEffect transition="in" filter="fade">
+                                      <p:cBhvr>
+                                        <p:cTn id="57" dur="500"/>
+                                        <p:tgtEl>
+                                          <p:spTgt spid="4"/>
+                                        </p:tgtEl>
+                                      </p:cBhvr>
+                                    </p:animEffect>
+                                  </p:childTnLst>
+                                </p:cTn>
+                              </p:par>
+                            </p:childTnLst>
+                          </p:cTn>
+                        </p:par>
+                      </p:childTnLst>
+                    </p:cTn>
+                  </p:par>
+                  <p:par>
+                    <p:cTn id="58" fill="hold">
+                      <p:stCondLst>
+                        <p:cond delay="indefinite"/>
+                      </p:stCondLst>
+                      <p:childTnLst>
+                        <p:par>
+                          <p:cTn id="59" fill="hold">
+                            <p:stCondLst>
+                              <p:cond delay="0"/>
+                            </p:stCondLst>
+                            <p:childTnLst>
+                              <p:par>
+                                <p:cTn id="60" presetID="10" presetClass="entr" presetSubtype="0" fill="hold" nodeType="clickEffect">
+                                  <p:stCondLst>
+                                    <p:cond delay="0"/>
+                                  </p:stCondLst>
+                                  <p:childTnLst>
+                                    <p:set>
+                                      <p:cBhvr>
+                                        <p:cTn id="61" dur="1" fill="hold">
+                                          <p:stCondLst>
+                                            <p:cond delay="0"/>
+                                          </p:stCondLst>
+                                        </p:cTn>
+                                        <p:tgtEl>
+                                          <p:spTgt spid="3"/>
+                                        </p:tgtEl>
+                                        <p:attrNameLst>
+                                          <p:attrName>style.visibility</p:attrName>
+                                        </p:attrNameLst>
+                                      </p:cBhvr>
+                                      <p:to>
+                                        <p:strVal val="visible"/>
+                                      </p:to>
+                                    </p:set>
+                                    <p:animEffect transition="in" filter="fade">
+                                      <p:cBhvr>
+                                        <p:cTn id="62" dur="500"/>
+                                        <p:tgtEl>
+                                          <p:spTgt spid="3"/>
+                                        </p:tgtEl>
+                                      </p:cBhvr>
+                                    </p:animEffect>
+                                  </p:childTnLst>
+                                </p:cTn>
+                              </p:par>
+                            </p:childTnLst>
+                          </p:cTn>
+                        </p:par>
+                      </p:childTnLst>
+                    </p:cTn>
+                  </p:par>
+                  <p:par>
+                    <p:cTn id="63" fill="hold">
+                      <p:stCondLst>
+                        <p:cond delay="indefinite"/>
+                      </p:stCondLst>
+                      <p:childTnLst>
+                        <p:par>
+                          <p:cTn id="64" fill="hold">
+                            <p:stCondLst>
+                              <p:cond delay="0"/>
+                            </p:stCondLst>
+                            <p:childTnLst>
+                              <p:par>
+                                <p:cTn id="65" presetID="1" presetClass="entr" presetSubtype="0" fill="hold" grpId="0" nodeType="clickEffect">
+                                  <p:stCondLst>
+                                    <p:cond delay="0"/>
+                                  </p:stCondLst>
+                                  <p:childTnLst>
+                                    <p:set>
+                                      <p:cBhvr>
+                                        <p:cTn id="66" dur="1" fill="hold">
+                                          <p:stCondLst>
+                                            <p:cond delay="0"/>
+                                          </p:stCondLst>
+                                        </p:cTn>
+                                        <p:tgtEl>
+                                          <p:spTgt spid="24"/>
+                                        </p:tgtEl>
+                                        <p:attrNameLst>
+                                          <p:attrName>style.visibility</p:attrName>
+                                        </p:attrNameLst>
+                                      </p:cBhvr>
+                                      <p:to>
+                                        <p:strVal val="visible"/>
+                                      </p:to>
+                                    </p:set>
+                                  </p:childTnLst>
+                                </p:cTn>
+                              </p:par>
+                            </p:childTnLst>
+                          </p:cTn>
+                        </p:par>
+                      </p:childTnLst>
+                    </p:cTn>
+                  </p:par>
+                  <p:par>
+                    <p:cTn id="67" fill="hold">
+                      <p:stCondLst>
+                        <p:cond delay="indefinite"/>
+                      </p:stCondLst>
+                      <p:childTnLst>
+                        <p:par>
+                          <p:cTn id="68" fill="hold">
+                            <p:stCondLst>
+                              <p:cond delay="0"/>
+                            </p:stCondLst>
+                            <p:childTnLst>
+                              <p:par>
+                                <p:cTn id="69" presetID="10" presetClass="entr" presetSubtype="0" fill="hold" grpId="0" nodeType="clickEffect">
+                                  <p:stCondLst>
+                                    <p:cond delay="0"/>
+                                  </p:stCondLst>
+                                  <p:childTnLst>
+                                    <p:set>
+                                      <p:cBhvr>
+                                        <p:cTn id="70" dur="1" fill="hold">
+                                          <p:stCondLst>
+                                            <p:cond delay="0"/>
+                                          </p:stCondLst>
+                                        </p:cTn>
+                                        <p:tgtEl>
+                                          <p:spTgt spid="10"/>
+                                        </p:tgtEl>
+                                        <p:attrNameLst>
+                                          <p:attrName>style.visibility</p:attrName>
+                                        </p:attrNameLst>
+                                      </p:cBhvr>
+                                      <p:to>
+                                        <p:strVal val="visible"/>
+                                      </p:to>
+                                    </p:set>
+                                    <p:animEffect transition="in" filter="fade">
+                                      <p:cBhvr>
+                                        <p:cTn id="71" dur="500"/>
+                                        <p:tgtEl>
+                                          <p:spTgt spid="10"/>
+                                        </p:tgtEl>
+                                      </p:cBhvr>
+                                    </p:animEffect>
+                                  </p:childTnLst>
+                                </p:cTn>
+                              </p:par>
+                            </p:childTnLst>
+                          </p:cTn>
+                        </p:par>
+                      </p:childTnLst>
+                    </p:cTn>
+                  </p:par>
+                  <p:par>
+                    <p:cTn id="72" fill="hold">
+                      <p:stCondLst>
+                        <p:cond delay="indefinite"/>
+                      </p:stCondLst>
+                      <p:childTnLst>
+                        <p:par>
+                          <p:cTn id="73" fill="hold">
+                            <p:stCondLst>
+                              <p:cond delay="0"/>
+                            </p:stCondLst>
+                            <p:childTnLst>
+                              <p:par>
+                                <p:cTn id="74" presetID="10" presetClass="entr" presetSubtype="0" fill="hold" grpId="0" nodeType="clickEffect">
+                                  <p:stCondLst>
+                                    <p:cond delay="0"/>
+                                  </p:stCondLst>
+                                  <p:childTnLst>
+                                    <p:set>
+                                      <p:cBhvr>
+                                        <p:cTn id="75" dur="1" fill="hold">
+                                          <p:stCondLst>
+                                            <p:cond delay="0"/>
+                                          </p:stCondLst>
+                                        </p:cTn>
+                                        <p:tgtEl>
+                                          <p:spTgt spid="21"/>
+                                        </p:tgtEl>
+                                        <p:attrNameLst>
+                                          <p:attrName>style.visibility</p:attrName>
+                                        </p:attrNameLst>
+                                      </p:cBhvr>
+                                      <p:to>
+                                        <p:strVal val="visible"/>
+                                      </p:to>
+                                    </p:set>
+                                    <p:animEffect transition="in" filter="fade">
+                                      <p:cBhvr>
+                                        <p:cTn id="76" dur="500"/>
+                                        <p:tgtEl>
+                                          <p:spTgt spid="21"/>
+                                        </p:tgtEl>
+                                      </p:cBhvr>
+                                    </p:animEffect>
+                                  </p:childTnLst>
+                                </p:cTn>
+                              </p:par>
+                            </p:childTnLst>
+                          </p:cTn>
+                        </p:par>
+                      </p:childTnLst>
+                    </p:cTn>
+                  </p:par>
+                  <p:par>
+                    <p:cTn id="77" fill="hold">
+                      <p:stCondLst>
+                        <p:cond delay="indefinite"/>
+                      </p:stCondLst>
+                      <p:childTnLst>
+                        <p:par>
+                          <p:cTn id="78" fill="hold">
+                            <p:stCondLst>
+                              <p:cond delay="0"/>
+                            </p:stCondLst>
+                            <p:childTnLst>
+                              <p:par>
+                                <p:cTn id="79" presetID="10" presetClass="entr" presetSubtype="0" fill="hold" grpId="0" nodeType="clickEffect">
+                                  <p:stCondLst>
+                                    <p:cond delay="0"/>
+                                  </p:stCondLst>
+                                  <p:childTnLst>
+                                    <p:set>
+                                      <p:cBhvr>
+                                        <p:cTn id="80" dur="1" fill="hold">
+                                          <p:stCondLst>
+                                            <p:cond delay="0"/>
+                                          </p:stCondLst>
+                                        </p:cTn>
+                                        <p:tgtEl>
+                                          <p:spTgt spid="9"/>
+                                        </p:tgtEl>
+                                        <p:attrNameLst>
+                                          <p:attrName>style.visibility</p:attrName>
+                                        </p:attrNameLst>
+                                      </p:cBhvr>
+                                      <p:to>
+                                        <p:strVal val="visible"/>
+                                      </p:to>
+                                    </p:set>
+                                    <p:animEffect transition="in" filter="fade">
+                                      <p:cBhvr>
+                                        <p:cTn id="81" dur="500"/>
+                                        <p:tgtEl>
+                                          <p:spTgt spid="9"/>
+                                        </p:tgtEl>
+                                      </p:cBhvr>
+                                    </p:animEffect>
+                                  </p:childTnLst>
+                                </p:cTn>
+                              </p:par>
+                            </p:childTnLst>
+                          </p:cTn>
+                        </p:par>
+                      </p:childTnLst>
+                    </p:cTn>
+                  </p:par>
+                  <p:par>
+                    <p:cTn id="82" fill="hold">
+                      <p:stCondLst>
+                        <p:cond delay="indefinite"/>
+                      </p:stCondLst>
+                      <p:childTnLst>
+                        <p:par>
+                          <p:cTn id="83" fill="hold">
+                            <p:stCondLst>
+                              <p:cond delay="0"/>
+                            </p:stCondLst>
+                            <p:childTnLst>
+                              <p:par>
+                                <p:cTn id="84" presetID="10" presetClass="entr" presetSubtype="0" fill="hold" grpId="0" nodeType="clickEffect">
+                                  <p:stCondLst>
+                                    <p:cond delay="0"/>
+                                  </p:stCondLst>
+                                  <p:childTnLst>
+                                    <p:set>
+                                      <p:cBhvr>
+                                        <p:cTn id="85" dur="1" fill="hold">
+                                          <p:stCondLst>
+                                            <p:cond delay="0"/>
+                                          </p:stCondLst>
+                                        </p:cTn>
+                                        <p:tgtEl>
+                                          <p:spTgt spid="20"/>
+                                        </p:tgtEl>
+                                        <p:attrNameLst>
+                                          <p:attrName>style.visibility</p:attrName>
+                                        </p:attrNameLst>
+                                      </p:cBhvr>
+                                      <p:to>
+                                        <p:strVal val="visible"/>
+                                      </p:to>
+                                    </p:set>
+                                    <p:animEffect transition="in" filter="fade">
+                                      <p:cBhvr>
+                                        <p:cTn id="86" dur="500"/>
+                                        <p:tgtEl>
+                                          <p:spTgt spid="20"/>
+                                        </p:tgtEl>
+                                      </p:cBhvr>
+                                    </p:animEffect>
+                                  </p:childTnLst>
+                                </p:cTn>
+                              </p:par>
+                            </p:childTnLst>
+                          </p:cTn>
+                        </p:par>
+                      </p:childTnLst>
+                    </p:cTn>
+                  </p:par>
+                  <p:par>
+                    <p:cTn id="87" fill="hold">
+                      <p:stCondLst>
+                        <p:cond delay="indefinite"/>
+                      </p:stCondLst>
+                      <p:childTnLst>
+                        <p:par>
+                          <p:cTn id="88" fill="hold">
+                            <p:stCondLst>
+                              <p:cond delay="0"/>
+                            </p:stCondLst>
+                            <p:childTnLst>
+                              <p:par>
+                                <p:cTn id="89" presetID="10" presetClass="entr" presetSubtype="0" fill="hold" nodeType="clickEffect">
+                                  <p:stCondLst>
+                                    <p:cond delay="0"/>
+                                  </p:stCondLst>
+                                  <p:childTnLst>
+                                    <p:set>
+                                      <p:cBhvr>
+                                        <p:cTn id="90" dur="1" fill="hold">
+                                          <p:stCondLst>
+                                            <p:cond delay="0"/>
+                                          </p:stCondLst>
+                                        </p:cTn>
+                                        <p:tgtEl>
+                                          <p:spTgt spid="8">
+                                            <p:txEl>
+                                              <p:pRg st="0" end="0"/>
+                                            </p:txEl>
+                                          </p:spTgt>
+                                        </p:tgtEl>
+                                        <p:attrNameLst>
+                                          <p:attrName>style.visibility</p:attrName>
+                                        </p:attrNameLst>
+                                      </p:cBhvr>
+                                      <p:to>
+                                        <p:strVal val="visible"/>
+                                      </p:to>
+                                    </p:set>
+                                    <p:animEffect transition="in" filter="fade">
+                                      <p:cBhvr>
+                                        <p:cTn id="91" dur="500"/>
+                                        <p:tgtEl>
+                                          <p:spTgt spid="8">
+                                            <p:txEl>
+                                              <p:pRg st="0" end="0"/>
+                                            </p:txEl>
+                                          </p:spTgt>
+                                        </p:tgtEl>
+                                      </p:cBhvr>
+                                    </p:animEffect>
+                                  </p:childTnLst>
+                                </p:cTn>
+                              </p:par>
+                            </p:childTnLst>
+                          </p:cTn>
+                        </p:par>
+                      </p:childTnLst>
+                    </p:cTn>
+                  </p:par>
+                  <p:par>
+                    <p:cTn id="92" fill="hold">
+                      <p:stCondLst>
+                        <p:cond delay="indefinite"/>
+                      </p:stCondLst>
+                      <p:childTnLst>
+                        <p:par>
+                          <p:cTn id="93" fill="hold">
+                            <p:stCondLst>
+                              <p:cond delay="0"/>
+                            </p:stCondLst>
+                            <p:childTnLst>
+                              <p:par>
+                                <p:cTn id="94" presetID="10" presetClass="entr" presetSubtype="0" fill="hold" nodeType="clickEffect">
+                                  <p:stCondLst>
+                                    <p:cond delay="0"/>
+                                  </p:stCondLst>
+                                  <p:childTnLst>
+                                    <p:set>
+                                      <p:cBhvr>
+                                        <p:cTn id="95" dur="1" fill="hold">
+                                          <p:stCondLst>
+                                            <p:cond delay="0"/>
+                                          </p:stCondLst>
+                                        </p:cTn>
+                                        <p:tgtEl>
+                                          <p:spTgt spid="8">
+                                            <p:txEl>
+                                              <p:pRg st="2" end="2"/>
+                                            </p:txEl>
+                                          </p:spTgt>
+                                        </p:tgtEl>
+                                        <p:attrNameLst>
+                                          <p:attrName>style.visibility</p:attrName>
+                                        </p:attrNameLst>
+                                      </p:cBhvr>
+                                      <p:to>
+                                        <p:strVal val="visible"/>
+                                      </p:to>
+                                    </p:set>
+                                    <p:animEffect transition="in" filter="fade">
+                                      <p:cBhvr>
+                                        <p:cTn id="96" dur="500"/>
+                                        <p:tgtEl>
+                                          <p:spTgt spid="8">
+                                            <p:txEl>
+                                              <p:pRg st="2" end="2"/>
+                                            </p:txEl>
+                                          </p:spTgt>
+                                        </p:tgtEl>
+                                      </p:cBhvr>
+                                    </p:animEffect>
+                                  </p:childTnLst>
+                                </p:cTn>
+                              </p:par>
+                            </p:childTnLst>
+                          </p:cTn>
+                        </p:par>
+                      </p:childTnLst>
+                    </p:cTn>
+                  </p:par>
+                  <p:par>
+                    <p:cTn id="97" fill="hold">
+                      <p:stCondLst>
+                        <p:cond delay="indefinite"/>
+                      </p:stCondLst>
+                      <p:childTnLst>
+                        <p:par>
+                          <p:cTn id="98" fill="hold">
+                            <p:stCondLst>
+                              <p:cond delay="0"/>
+                            </p:stCondLst>
+                            <p:childTnLst>
+                              <p:par>
+                                <p:cTn id="99" presetID="10" presetClass="entr" presetSubtype="0" fill="hold" grpId="0" nodeType="clickEffect">
+                                  <p:stCondLst>
+                                    <p:cond delay="0"/>
+                                  </p:stCondLst>
+                                  <p:childTnLst>
+                                    <p:set>
+                                      <p:cBhvr>
+                                        <p:cTn id="100" dur="1" fill="hold">
+                                          <p:stCondLst>
+                                            <p:cond delay="0"/>
+                                          </p:stCondLst>
+                                        </p:cTn>
+                                        <p:tgtEl>
+                                          <p:spTgt spid="19"/>
+                                        </p:tgtEl>
+                                        <p:attrNameLst>
+                                          <p:attrName>style.visibility</p:attrName>
+                                        </p:attrNameLst>
+                                      </p:cBhvr>
+                                      <p:to>
+                                        <p:strVal val="visible"/>
+                                      </p:to>
+                                    </p:set>
+                                    <p:animEffect transition="in" filter="fade">
+                                      <p:cBhvr>
+                                        <p:cTn id="101" dur="500"/>
+                                        <p:tgtEl>
+                                          <p:spTgt spid="19"/>
+                                        </p:tgtEl>
+                                      </p:cBhvr>
+                                    </p:animEffect>
+                                  </p:childTnLst>
+                                </p:cTn>
+                              </p:par>
+                            </p:childTnLst>
+                          </p:cTn>
+                        </p:par>
+                      </p:childTnLst>
+                    </p:cTn>
+                  </p:par>
+                  <p:par>
+                    <p:cTn id="102" fill="hold">
+                      <p:stCondLst>
+                        <p:cond delay="indefinite"/>
+                      </p:stCondLst>
+                      <p:childTnLst>
+                        <p:par>
+                          <p:cTn id="103" fill="hold">
+                            <p:stCondLst>
+                              <p:cond delay="0"/>
+                            </p:stCondLst>
+                            <p:childTnLst>
+                              <p:par>
+                                <p:cTn id="104" presetID="10" presetClass="entr" presetSubtype="0" fill="hold" grpId="0" nodeType="clickEffect">
+                                  <p:stCondLst>
+                                    <p:cond delay="0"/>
+                                  </p:stCondLst>
+                                  <p:childTnLst>
+                                    <p:set>
+                                      <p:cBhvr>
+                                        <p:cTn id="105" dur="1" fill="hold">
+                                          <p:stCondLst>
+                                            <p:cond delay="0"/>
+                                          </p:stCondLst>
+                                        </p:cTn>
+                                        <p:tgtEl>
+                                          <p:spTgt spid="2"/>
+                                        </p:tgtEl>
+                                        <p:attrNameLst>
+                                          <p:attrName>style.visibility</p:attrName>
+                                        </p:attrNameLst>
+                                      </p:cBhvr>
+                                      <p:to>
+                                        <p:strVal val="visible"/>
+                                      </p:to>
+                                    </p:set>
+                                    <p:animEffect transition="in" filter="fade">
+                                      <p:cBhvr>
+                                        <p:cTn id="106" dur="500"/>
+                                        <p:tgtEl>
+                                          <p:spTgt spid="2"/>
+                                        </p:tgtEl>
+                                      </p:cBhvr>
+                                    </p:animEffect>
+                                  </p:childTnLst>
+                                </p:cTn>
+                              </p:par>
+                            </p:childTnLst>
+                          </p:cTn>
+                        </p:par>
+                      </p:childTnLst>
+                    </p:cTn>
+                  </p:par>
+                  <p:par>
+                    <p:cTn id="107" fill="hold">
+                      <p:stCondLst>
+                        <p:cond delay="indefinite"/>
+                      </p:stCondLst>
+                      <p:childTnLst>
+                        <p:par>
+                          <p:cTn id="108" fill="hold">
+                            <p:stCondLst>
+                              <p:cond delay="0"/>
+                            </p:stCondLst>
+                            <p:childTnLst>
+                              <p:par>
+                                <p:cTn id="109" presetID="10" presetClass="entr" presetSubtype="0" fill="hold" nodeType="clickEffect">
+                                  <p:stCondLst>
+                                    <p:cond delay="0"/>
+                                  </p:stCondLst>
+                                  <p:childTnLst>
+                                    <p:set>
+                                      <p:cBhvr>
+                                        <p:cTn id="110" dur="1" fill="hold">
+                                          <p:stCondLst>
+                                            <p:cond delay="0"/>
+                                          </p:stCondLst>
+                                        </p:cTn>
+                                        <p:tgtEl>
+                                          <p:spTgt spid="22"/>
+                                        </p:tgtEl>
+                                        <p:attrNameLst>
+                                          <p:attrName>style.visibility</p:attrName>
+                                        </p:attrNameLst>
+                                      </p:cBhvr>
+                                      <p:to>
+                                        <p:strVal val="visible"/>
+                                      </p:to>
+                                    </p:set>
+                                    <p:animEffect transition="in" filter="fade">
+                                      <p:cBhvr>
+                                        <p:cTn id="111" dur="500"/>
+                                        <p:tgtEl>
+                                          <p:spTgt spid="22"/>
+                                        </p:tgtEl>
+                                      </p:cBhvr>
+                                    </p:animEffect>
+                                  </p:childTnLst>
+                                </p:cTn>
+                              </p:par>
+                            </p:childTnLst>
+                          </p:cTn>
+                        </p:par>
+                      </p:childTnLst>
+                    </p:cTn>
+                  </p:par>
+                  <p:par>
+                    <p:cTn id="112" fill="hold">
+                      <p:stCondLst>
+                        <p:cond delay="indefinite"/>
+                      </p:stCondLst>
+                      <p:childTnLst>
+                        <p:par>
+                          <p:cTn id="113" fill="hold">
+                            <p:stCondLst>
+                              <p:cond delay="0"/>
+                            </p:stCondLst>
+                            <p:childTnLst>
+                              <p:par>
+                                <p:cTn id="114" presetID="10" presetClass="entr" presetSubtype="0" fill="hold" nodeType="clickEffect">
+                                  <p:stCondLst>
+                                    <p:cond delay="0"/>
+                                  </p:stCondLst>
+                                  <p:childTnLst>
+                                    <p:set>
+                                      <p:cBhvr>
+                                        <p:cTn id="115" dur="1" fill="hold">
+                                          <p:stCondLst>
+                                            <p:cond delay="0"/>
+                                          </p:stCondLst>
+                                        </p:cTn>
+                                        <p:tgtEl>
+                                          <p:spTgt spid="23"/>
+                                        </p:tgtEl>
+                                        <p:attrNameLst>
+                                          <p:attrName>style.visibility</p:attrName>
+                                        </p:attrNameLst>
+                                      </p:cBhvr>
+                                      <p:to>
+                                        <p:strVal val="visible"/>
+                                      </p:to>
+                                    </p:set>
+                                    <p:animEffect transition="in" filter="fade">
+                                      <p:cBhvr>
+                                        <p:cTn id="116" dur="500"/>
+                                        <p:tgtEl>
+                                          <p:spTgt spid="23"/>
+                                        </p:tgtEl>
+                                      </p:cBhvr>
+                                    </p:animEffect>
+                                  </p:childTnLst>
+                                </p:cTn>
+                              </p:par>
+                            </p:childTnLst>
+                          </p:cTn>
+                        </p:par>
+                      </p:childTnLst>
+                    </p:cTn>
+                  </p:par>
+                </p:childTnLst>
+              </p:cTn>
+              <p:prevCondLst>
+                <p:cond evt="onPrev" delay="0">
+                  <p:tgtEl>
+                    <p:sldTgt/>
+                  </p:tgtEl>
+                </p:cond>
+              </p:prevCondLst>
+              <p:nextCondLst>
+                <p:cond evt="onNext" delay="0">
+                  <p:tgtEl>
+                    <p:sldTgt/>
+                  </p:tgtEl>
+                </p:cond>
+              </p:nextCondLst>
+            </p:seq>
+          </p:childTnLst>
+        </p:cTn>
+      </p:par>
+    </p:tnLst>
+    <p:bldLst>
+      <p:bldP spid="7" grpId="0" animBg="1"/>
+      <p:bldP spid="2" grpId="0"/>
+      <p:bldP spid="9" grpId="0"/>
+      <p:bldP spid="10" grpId="0"/>
+      <p:bldP spid="12" grpId="0" animBg="1"/>
+      <p:bldP spid="11" grpId="0" animBg="1"/>
+      <p:bldP spid="13" grpId="0" animBg="1"/>
+      <p:bldP spid="15" grpId="0" animBg="1"/>
+      <p:bldP spid="16" grpId="0" animBg="1"/>
+      <p:bldP spid="17" grpId="0" animBg="1"/>
+      <p:bldP spid="19" grpId="0" animBg="1"/>
+      <p:bldP spid="20" grpId="0" animBg="1"/>
+      <p:bldP spid="21" grpId="0" animBg="1"/>
+      <p:bldP spid="14" grpId="0" animBg="1"/>
+      <p:bldP spid="24" grpId="0" animBg="1"/>
+    </p:bldLst>
+  </p:timing>
 </p:sld>
 </file>
 

</xml_diff>